<commit_message>
Added Week 3 recap, updated Week 3 powerpoint, updated homepage
</commit_message>
<xml_diff>
--- a/Week-03/Week-03_LogicalTestsAndNestedFunctions.pptx
+++ b/Week-03/Week-03_LogicalTestsAndNestedFunctions.pptx
@@ -5,7 +5,7 @@
     <p:sldMasterId id="2147483648" r:id="rId4"/>
   </p:sldMasterIdLst>
   <p:notesMasterIdLst>
-    <p:notesMasterId r:id="rId14"/>
+    <p:notesMasterId r:id="rId15"/>
   </p:notesMasterIdLst>
   <p:sldIdLst>
     <p:sldId id="256" r:id="rId5"/>
@@ -13,10 +13,11 @@
     <p:sldId id="272" r:id="rId7"/>
     <p:sldId id="273" r:id="rId8"/>
     <p:sldId id="275" r:id="rId9"/>
-    <p:sldId id="276" r:id="rId10"/>
-    <p:sldId id="274" r:id="rId11"/>
-    <p:sldId id="277" r:id="rId12"/>
-    <p:sldId id="278" r:id="rId13"/>
+    <p:sldId id="280" r:id="rId10"/>
+    <p:sldId id="276" r:id="rId11"/>
+    <p:sldId id="274" r:id="rId12"/>
+    <p:sldId id="277" r:id="rId13"/>
+    <p:sldId id="278" r:id="rId14"/>
   </p:sldIdLst>
   <p:sldSz cx="12192000" cy="6858000"/>
   <p:notesSz cx="7010400" cy="9296400"/>
@@ -973,7 +974,7 @@
           <a:p>
             <a:fld id="{FD29A1BE-704B-408E-AC54-DB5007F9FC79}" type="datetimeFigureOut">
               <a:rPr lang="en-US" smtClean="0"/>
-              <a:t>7/26/2022</a:t>
+              <a:t>7/27/2022</a:t>
             </a:fld>
             <a:endParaRPr lang="en-US"/>
           </a:p>
@@ -1324,6 +1325,90 @@
 </p:notes>
 </file>
 
+<file path=ppt/notesSlides/notesSlide10.xml><?xml version="1.0" encoding="utf-8"?>
+<p:notes xmlns:a="http://schemas.openxmlformats.org/drawingml/2006/main" xmlns:r="http://schemas.openxmlformats.org/officeDocument/2006/relationships" xmlns:p="http://schemas.openxmlformats.org/presentationml/2006/main">
+  <p:cSld>
+    <p:spTree>
+      <p:nvGrpSpPr>
+        <p:cNvPr id="1" name=""/>
+        <p:cNvGrpSpPr/>
+        <p:nvPr/>
+      </p:nvGrpSpPr>
+      <p:grpSpPr>
+        <a:xfrm>
+          <a:off x="0" y="0"/>
+          <a:ext cx="0" cy="0"/>
+          <a:chOff x="0" y="0"/>
+          <a:chExt cx="0" cy="0"/>
+        </a:xfrm>
+      </p:grpSpPr>
+      <p:sp>
+        <p:nvSpPr>
+          <p:cNvPr id="2" name="Slide Image Placeholder 1"/>
+          <p:cNvSpPr>
+            <a:spLocks noGrp="1" noRot="1" noChangeAspect="1"/>
+          </p:cNvSpPr>
+          <p:nvPr>
+            <p:ph type="sldImg"/>
+          </p:nvPr>
+        </p:nvSpPr>
+        <p:spPr/>
+      </p:sp>
+      <p:sp>
+        <p:nvSpPr>
+          <p:cNvPr id="3" name="Notes Placeholder 2"/>
+          <p:cNvSpPr>
+            <a:spLocks noGrp="1"/>
+          </p:cNvSpPr>
+          <p:nvPr>
+            <p:ph type="body" idx="1"/>
+          </p:nvPr>
+        </p:nvSpPr>
+        <p:spPr/>
+        <p:txBody>
+          <a:bodyPr/>
+          <a:lstStyle/>
+          <a:p>
+            <a:endParaRPr lang="en-US" dirty="0"/>
+          </a:p>
+        </p:txBody>
+      </p:sp>
+      <p:sp>
+        <p:nvSpPr>
+          <p:cNvPr id="4" name="Slide Number Placeholder 3"/>
+          <p:cNvSpPr>
+            <a:spLocks noGrp="1"/>
+          </p:cNvSpPr>
+          <p:nvPr>
+            <p:ph type="sldNum" sz="quarter" idx="5"/>
+          </p:nvPr>
+        </p:nvSpPr>
+        <p:spPr/>
+        <p:txBody>
+          <a:bodyPr/>
+          <a:lstStyle/>
+          <a:p>
+            <a:fld id="{A5BA2AB6-893C-4B32-8552-59A2DFCC33C2}" type="slidenum">
+              <a:rPr lang="en-US" smtClean="0"/>
+              <a:t>10</a:t>
+            </a:fld>
+            <a:endParaRPr lang="en-US"/>
+          </a:p>
+        </p:txBody>
+      </p:sp>
+    </p:spTree>
+    <p:extLst>
+      <p:ext uri="{BB962C8B-B14F-4D97-AF65-F5344CB8AC3E}">
+        <p14:creationId xmlns:p14="http://schemas.microsoft.com/office/powerpoint/2010/main" val="902382676"/>
+      </p:ext>
+    </p:extLst>
+  </p:cSld>
+  <p:clrMapOvr>
+    <a:masterClrMapping/>
+  </p:clrMapOvr>
+</p:notes>
+</file>
+
 <file path=ppt/notesSlides/notesSlide2.xml><?xml version="1.0" encoding="utf-8"?>
 <p:notes xmlns:a="http://schemas.openxmlformats.org/drawingml/2006/main" xmlns:r="http://schemas.openxmlformats.org/officeDocument/2006/relationships" xmlns:p="http://schemas.openxmlformats.org/presentationml/2006/main">
   <p:cSld>
@@ -1743,7 +1828,7 @@
     </p:spTree>
     <p:extLst>
       <p:ext uri="{BB962C8B-B14F-4D97-AF65-F5344CB8AC3E}">
-        <p14:creationId xmlns:p14="http://schemas.microsoft.com/office/powerpoint/2010/main" val="2697038975"/>
+        <p14:creationId xmlns:p14="http://schemas.microsoft.com/office/powerpoint/2010/main" val="1480924902"/>
       </p:ext>
     </p:extLst>
   </p:cSld>
@@ -1797,6 +1882,9 @@
           <a:bodyPr/>
           <a:lstStyle/>
           <a:p>
+            <a:pPr defTabSz="931774">
+              <a:defRPr/>
+            </a:pPr>
             <a:endParaRPr lang="en-US" dirty="0"/>
           </a:p>
         </p:txBody>
@@ -1827,7 +1915,7 @@
     </p:spTree>
     <p:extLst>
       <p:ext uri="{BB962C8B-B14F-4D97-AF65-F5344CB8AC3E}">
-        <p14:creationId xmlns:p14="http://schemas.microsoft.com/office/powerpoint/2010/main" val="2343529018"/>
+        <p14:creationId xmlns:p14="http://schemas.microsoft.com/office/powerpoint/2010/main" val="2697038975"/>
       </p:ext>
     </p:extLst>
   </p:cSld>
@@ -1911,7 +1999,7 @@
     </p:spTree>
     <p:extLst>
       <p:ext uri="{BB962C8B-B14F-4D97-AF65-F5344CB8AC3E}">
-        <p14:creationId xmlns:p14="http://schemas.microsoft.com/office/powerpoint/2010/main" val="472328042"/>
+        <p14:creationId xmlns:p14="http://schemas.microsoft.com/office/powerpoint/2010/main" val="2343529018"/>
       </p:ext>
     </p:extLst>
   </p:cSld>
@@ -1995,7 +2083,7 @@
     </p:spTree>
     <p:extLst>
       <p:ext uri="{BB962C8B-B14F-4D97-AF65-F5344CB8AC3E}">
-        <p14:creationId xmlns:p14="http://schemas.microsoft.com/office/powerpoint/2010/main" val="902382676"/>
+        <p14:creationId xmlns:p14="http://schemas.microsoft.com/office/powerpoint/2010/main" val="472328042"/>
       </p:ext>
     </p:extLst>
   </p:cSld>
@@ -2152,7 +2240,7 @@
           <a:p>
             <a:fld id="{2C6FF9A6-8E7D-412C-A4AD-F25884266C28}" type="datetimeFigureOut">
               <a:rPr lang="en-US" smtClean="0"/>
-              <a:t>7/26/2022</a:t>
+              <a:t>7/27/2022</a:t>
             </a:fld>
             <a:endParaRPr lang="en-US"/>
           </a:p>
@@ -2350,7 +2438,7 @@
           <a:p>
             <a:fld id="{2C6FF9A6-8E7D-412C-A4AD-F25884266C28}" type="datetimeFigureOut">
               <a:rPr lang="en-US" smtClean="0"/>
-              <a:t>7/26/2022</a:t>
+              <a:t>7/27/2022</a:t>
             </a:fld>
             <a:endParaRPr lang="en-US"/>
           </a:p>
@@ -2558,7 +2646,7 @@
           <a:p>
             <a:fld id="{2C6FF9A6-8E7D-412C-A4AD-F25884266C28}" type="datetimeFigureOut">
               <a:rPr lang="en-US" smtClean="0"/>
-              <a:t>7/26/2022</a:t>
+              <a:t>7/27/2022</a:t>
             </a:fld>
             <a:endParaRPr lang="en-US"/>
           </a:p>
@@ -2756,7 +2844,7 @@
           <a:p>
             <a:fld id="{2C6FF9A6-8E7D-412C-A4AD-F25884266C28}" type="datetimeFigureOut">
               <a:rPr lang="en-US" smtClean="0"/>
-              <a:t>7/26/2022</a:t>
+              <a:t>7/27/2022</a:t>
             </a:fld>
             <a:endParaRPr lang="en-US"/>
           </a:p>
@@ -3031,7 +3119,7 @@
           <a:p>
             <a:fld id="{2C6FF9A6-8E7D-412C-A4AD-F25884266C28}" type="datetimeFigureOut">
               <a:rPr lang="en-US" smtClean="0"/>
-              <a:t>7/26/2022</a:t>
+              <a:t>7/27/2022</a:t>
             </a:fld>
             <a:endParaRPr lang="en-US"/>
           </a:p>
@@ -3296,7 +3384,7 @@
           <a:p>
             <a:fld id="{2C6FF9A6-8E7D-412C-A4AD-F25884266C28}" type="datetimeFigureOut">
               <a:rPr lang="en-US" smtClean="0"/>
-              <a:t>7/26/2022</a:t>
+              <a:t>7/27/2022</a:t>
             </a:fld>
             <a:endParaRPr lang="en-US"/>
           </a:p>
@@ -3708,7 +3796,7 @@
           <a:p>
             <a:fld id="{2C6FF9A6-8E7D-412C-A4AD-F25884266C28}" type="datetimeFigureOut">
               <a:rPr lang="en-US" smtClean="0"/>
-              <a:t>7/26/2022</a:t>
+              <a:t>7/27/2022</a:t>
             </a:fld>
             <a:endParaRPr lang="en-US"/>
           </a:p>
@@ -3849,7 +3937,7 @@
           <a:p>
             <a:fld id="{2C6FF9A6-8E7D-412C-A4AD-F25884266C28}" type="datetimeFigureOut">
               <a:rPr lang="en-US" smtClean="0"/>
-              <a:t>7/26/2022</a:t>
+              <a:t>7/27/2022</a:t>
             </a:fld>
             <a:endParaRPr lang="en-US"/>
           </a:p>
@@ -3962,7 +4050,7 @@
           <a:p>
             <a:fld id="{2C6FF9A6-8E7D-412C-A4AD-F25884266C28}" type="datetimeFigureOut">
               <a:rPr lang="en-US" smtClean="0"/>
-              <a:t>7/26/2022</a:t>
+              <a:t>7/27/2022</a:t>
             </a:fld>
             <a:endParaRPr lang="en-US"/>
           </a:p>
@@ -4273,7 +4361,7 @@
           <a:p>
             <a:fld id="{2C6FF9A6-8E7D-412C-A4AD-F25884266C28}" type="datetimeFigureOut">
               <a:rPr lang="en-US" smtClean="0"/>
-              <a:t>7/26/2022</a:t>
+              <a:t>7/27/2022</a:t>
             </a:fld>
             <a:endParaRPr lang="en-US"/>
           </a:p>
@@ -4561,7 +4649,7 @@
           <a:p>
             <a:fld id="{2C6FF9A6-8E7D-412C-A4AD-F25884266C28}" type="datetimeFigureOut">
               <a:rPr lang="en-US" smtClean="0"/>
-              <a:t>7/26/2022</a:t>
+              <a:t>7/27/2022</a:t>
             </a:fld>
             <a:endParaRPr lang="en-US"/>
           </a:p>
@@ -4802,7 +4890,7 @@
           <a:p>
             <a:fld id="{2C6FF9A6-8E7D-412C-A4AD-F25884266C28}" type="datetimeFigureOut">
               <a:rPr lang="en-US" smtClean="0"/>
-              <a:t>7/26/2022</a:t>
+              <a:t>7/27/2022</a:t>
             </a:fld>
             <a:endParaRPr lang="en-US"/>
           </a:p>
@@ -5447,6 +5535,201 @@
 </p:sld>
 </file>
 
+<file path=ppt/slides/slide10.xml><?xml version="1.0" encoding="utf-8"?>
+<p:sld xmlns:a="http://schemas.openxmlformats.org/drawingml/2006/main" xmlns:r="http://schemas.openxmlformats.org/officeDocument/2006/relationships" xmlns:p="http://schemas.openxmlformats.org/presentationml/2006/main">
+  <p:cSld>
+    <p:spTree>
+      <p:nvGrpSpPr>
+        <p:cNvPr id="1" name=""/>
+        <p:cNvGrpSpPr/>
+        <p:nvPr/>
+      </p:nvGrpSpPr>
+      <p:grpSpPr>
+        <a:xfrm>
+          <a:off x="0" y="0"/>
+          <a:ext cx="0" cy="0"/>
+          <a:chOff x="0" y="0"/>
+          <a:chExt cx="0" cy="0"/>
+        </a:xfrm>
+      </p:grpSpPr>
+      <p:sp>
+        <p:nvSpPr>
+          <p:cNvPr id="12" name="Title 1">
+            <a:extLst>
+              <a:ext uri="{FF2B5EF4-FFF2-40B4-BE49-F238E27FC236}">
+                <a16:creationId xmlns:a16="http://schemas.microsoft.com/office/drawing/2014/main" id="{F45D353A-45D9-BDD2-D808-7C349F6E83E0}"/>
+              </a:ext>
+            </a:extLst>
+          </p:cNvPr>
+          <p:cNvSpPr>
+            <a:spLocks noGrp="1"/>
+          </p:cNvSpPr>
+          <p:nvPr>
+            <p:ph type="title"/>
+          </p:nvPr>
+        </p:nvSpPr>
+        <p:spPr>
+          <a:xfrm>
+            <a:off x="838200" y="365125"/>
+            <a:ext cx="10515600" cy="568325"/>
+          </a:xfrm>
+        </p:spPr>
+        <p:txBody>
+          <a:bodyPr>
+            <a:normAutofit fontScale="90000"/>
+          </a:bodyPr>
+          <a:lstStyle/>
+          <a:p>
+            <a:r>
+              <a:rPr lang="en-US" sz="3600" b="1" dirty="0">
+                <a:solidFill>
+                  <a:schemeClr val="accent1"/>
+                </a:solidFill>
+              </a:rPr>
+              <a:t>Nested Functions</a:t>
+            </a:r>
+          </a:p>
+        </p:txBody>
+      </p:sp>
+      <p:pic>
+        <p:nvPicPr>
+          <p:cNvPr id="3" name="Picture 2">
+            <a:extLst>
+              <a:ext uri="{FF2B5EF4-FFF2-40B4-BE49-F238E27FC236}">
+                <a16:creationId xmlns:a16="http://schemas.microsoft.com/office/drawing/2014/main" id="{9381D0F8-E64A-F8DF-9A99-0069450E1640}"/>
+              </a:ext>
+            </a:extLst>
+          </p:cNvPr>
+          <p:cNvPicPr>
+            <a:picLocks noChangeAspect="1"/>
+          </p:cNvPicPr>
+          <p:nvPr/>
+        </p:nvPicPr>
+        <p:blipFill>
+          <a:blip r:embed="rId3"/>
+          <a:stretch>
+            <a:fillRect/>
+          </a:stretch>
+        </p:blipFill>
+        <p:spPr>
+          <a:xfrm>
+            <a:off x="1228726" y="3828997"/>
+            <a:ext cx="4475666" cy="2209434"/>
+          </a:xfrm>
+          <a:prstGeom prst="rect">
+            <a:avLst/>
+          </a:prstGeom>
+        </p:spPr>
+      </p:pic>
+      <p:pic>
+        <p:nvPicPr>
+          <p:cNvPr id="6" name="Picture 5">
+            <a:extLst>
+              <a:ext uri="{FF2B5EF4-FFF2-40B4-BE49-F238E27FC236}">
+                <a16:creationId xmlns:a16="http://schemas.microsoft.com/office/drawing/2014/main" id="{DF108ECA-C365-164B-5BB5-DE2A35316E5D}"/>
+              </a:ext>
+            </a:extLst>
+          </p:cNvPr>
+          <p:cNvPicPr>
+            <a:picLocks noChangeAspect="1"/>
+          </p:cNvPicPr>
+          <p:nvPr/>
+        </p:nvPicPr>
+        <p:blipFill>
+          <a:blip r:embed="rId4"/>
+          <a:stretch>
+            <a:fillRect/>
+          </a:stretch>
+        </p:blipFill>
+        <p:spPr>
+          <a:xfrm>
+            <a:off x="6707505" y="3731045"/>
+            <a:ext cx="4752975" cy="2307386"/>
+          </a:xfrm>
+          <a:prstGeom prst="rect">
+            <a:avLst/>
+          </a:prstGeom>
+        </p:spPr>
+      </p:pic>
+      <p:sp>
+        <p:nvSpPr>
+          <p:cNvPr id="10" name="Content Placeholder 9">
+            <a:extLst>
+              <a:ext uri="{FF2B5EF4-FFF2-40B4-BE49-F238E27FC236}">
+                <a16:creationId xmlns:a16="http://schemas.microsoft.com/office/drawing/2014/main" id="{045DEBD5-CAF6-BA4E-4B8E-32ADAC1F9719}"/>
+              </a:ext>
+            </a:extLst>
+          </p:cNvPr>
+          <p:cNvSpPr>
+            <a:spLocks noGrp="1"/>
+          </p:cNvSpPr>
+          <p:nvPr>
+            <p:ph idx="1"/>
+          </p:nvPr>
+        </p:nvSpPr>
+        <p:spPr>
+          <a:xfrm>
+            <a:off x="838200" y="3260672"/>
+            <a:ext cx="10515600" cy="568325"/>
+          </a:xfrm>
+        </p:spPr>
+        <p:txBody>
+          <a:bodyPr/>
+          <a:lstStyle/>
+          <a:p>
+            <a:pPr marL="0" indent="0">
+              <a:buNone/>
+            </a:pPr>
+            <a:r>
+              <a:rPr lang="en-US" dirty="0"/>
+              <a:t>These are the same:</a:t>
+            </a:r>
+          </a:p>
+        </p:txBody>
+      </p:sp>
+      <p:pic>
+        <p:nvPicPr>
+          <p:cNvPr id="7" name="Picture 6">
+            <a:extLst>
+              <a:ext uri="{FF2B5EF4-FFF2-40B4-BE49-F238E27FC236}">
+                <a16:creationId xmlns:a16="http://schemas.microsoft.com/office/drawing/2014/main" id="{F8F6CCC4-EE61-73D5-5F52-C9DD99485ED4}"/>
+              </a:ext>
+            </a:extLst>
+          </p:cNvPr>
+          <p:cNvPicPr>
+            <a:picLocks noChangeAspect="1"/>
+          </p:cNvPicPr>
+          <p:nvPr/>
+        </p:nvPicPr>
+        <p:blipFill>
+          <a:blip r:embed="rId5"/>
+          <a:stretch>
+            <a:fillRect/>
+          </a:stretch>
+        </p:blipFill>
+        <p:spPr>
+          <a:xfrm>
+            <a:off x="1385887" y="1088711"/>
+            <a:ext cx="9420225" cy="2151533"/>
+          </a:xfrm>
+          <a:prstGeom prst="rect">
+            <a:avLst/>
+          </a:prstGeom>
+        </p:spPr>
+      </p:pic>
+    </p:spTree>
+    <p:extLst>
+      <p:ext uri="{BB962C8B-B14F-4D97-AF65-F5344CB8AC3E}">
+        <p14:creationId xmlns:p14="http://schemas.microsoft.com/office/powerpoint/2010/main" val="3815552995"/>
+      </p:ext>
+    </p:extLst>
+  </p:cSld>
+  <p:clrMapOvr>
+    <a:masterClrMapping/>
+  </p:clrMapOvr>
+</p:sld>
+</file>
+
 <file path=ppt/slides/slide2.xml><?xml version="1.0" encoding="utf-8"?>
 <p:sld xmlns:a="http://schemas.openxmlformats.org/drawingml/2006/main" xmlns:r="http://schemas.openxmlformats.org/officeDocument/2006/relationships" xmlns:p="http://schemas.openxmlformats.org/presentationml/2006/main">
   <p:cSld>
@@ -7404,10 +7687,10 @@
       </p:sp>
       <p:pic>
         <p:nvPicPr>
-          <p:cNvPr id="5" name="Picture 4">
-            <a:extLst>
-              <a:ext uri="{FF2B5EF4-FFF2-40B4-BE49-F238E27FC236}">
-                <a16:creationId xmlns:a16="http://schemas.microsoft.com/office/drawing/2014/main" id="{70DE1C58-C3B9-E539-5F5A-7295AE33E6FB}"/>
+          <p:cNvPr id="4" name="Picture 3">
+            <a:extLst>
+              <a:ext uri="{FF2B5EF4-FFF2-40B4-BE49-F238E27FC236}">
+                <a16:creationId xmlns:a16="http://schemas.microsoft.com/office/drawing/2014/main" id="{3D96147F-14B2-C448-6E23-5D936FAECD28}"/>
               </a:ext>
             </a:extLst>
           </p:cNvPr>
@@ -7424,8 +7707,8 @@
         </p:blipFill>
         <p:spPr>
           <a:xfrm>
-            <a:off x="1642075" y="3009898"/>
-            <a:ext cx="8907850" cy="2198915"/>
+            <a:off x="1004887" y="3151188"/>
+            <a:ext cx="10182225" cy="2028825"/>
           </a:xfrm>
           <a:prstGeom prst="rect">
             <a:avLst/>
@@ -7478,20 +7761,13 @@
             <p:ph type="title"/>
           </p:nvPr>
         </p:nvSpPr>
-        <p:spPr>
-          <a:xfrm>
-            <a:off x="838200" y="365125"/>
-            <a:ext cx="10515600" cy="568325"/>
-          </a:xfrm>
-        </p:spPr>
-        <p:txBody>
-          <a:bodyPr>
-            <a:normAutofit fontScale="90000"/>
-          </a:bodyPr>
+        <p:spPr/>
+        <p:txBody>
+          <a:bodyPr/>
           <a:lstStyle/>
           <a:p>
             <a:r>
-              <a:rPr lang="en-US" sz="3600" b="1" dirty="0">
+              <a:rPr lang="en-US" b="1" dirty="0">
                 <a:solidFill>
                   <a:schemeClr val="accent1"/>
                 </a:solidFill>
@@ -7501,154 +7777,30 @@
           </a:p>
         </p:txBody>
       </p:sp>
-      <p:pic>
-        <p:nvPicPr>
-          <p:cNvPr id="5" name="Picture 4">
-            <a:extLst>
-              <a:ext uri="{FF2B5EF4-FFF2-40B4-BE49-F238E27FC236}">
-                <a16:creationId xmlns:a16="http://schemas.microsoft.com/office/drawing/2014/main" id="{70DE1C58-C3B9-E539-5F5A-7295AE33E6FB}"/>
-              </a:ext>
-            </a:extLst>
-          </p:cNvPr>
-          <p:cNvPicPr>
-            <a:picLocks noChangeAspect="1"/>
-          </p:cNvPicPr>
-          <p:nvPr/>
-        </p:nvPicPr>
-        <p:blipFill>
-          <a:blip r:embed="rId3"/>
-          <a:stretch>
-            <a:fillRect/>
-          </a:stretch>
-        </p:blipFill>
+      <p:sp>
+        <p:nvSpPr>
+          <p:cNvPr id="10" name="Content Placeholder 9">
+            <a:extLst>
+              <a:ext uri="{FF2B5EF4-FFF2-40B4-BE49-F238E27FC236}">
+                <a16:creationId xmlns:a16="http://schemas.microsoft.com/office/drawing/2014/main" id="{77B28368-EEE3-F4C7-F366-0FE145CEDB98}"/>
+              </a:ext>
+            </a:extLst>
+          </p:cNvPr>
+          <p:cNvSpPr>
+            <a:spLocks noGrp="1"/>
+          </p:cNvSpPr>
+          <p:nvPr>
+            <p:ph idx="1"/>
+          </p:nvPr>
+        </p:nvSpPr>
         <p:spPr>
           <a:xfrm>
-            <a:off x="2785909" y="1091291"/>
-            <a:ext cx="6620182" cy="1634201"/>
-          </a:xfrm>
-          <a:prstGeom prst="rect">
-            <a:avLst/>
-          </a:prstGeom>
-        </p:spPr>
-      </p:pic>
-      <p:pic>
-        <p:nvPicPr>
-          <p:cNvPr id="7" name="Picture 6">
-            <a:extLst>
-              <a:ext uri="{FF2B5EF4-FFF2-40B4-BE49-F238E27FC236}">
-                <a16:creationId xmlns:a16="http://schemas.microsoft.com/office/drawing/2014/main" id="{500F9DB6-FC50-5C69-32CE-94EE18673F64}"/>
-              </a:ext>
-            </a:extLst>
-          </p:cNvPr>
-          <p:cNvPicPr>
-            <a:picLocks noChangeAspect="1"/>
-          </p:cNvPicPr>
-          <p:nvPr/>
-        </p:nvPicPr>
-        <p:blipFill>
-          <a:blip r:embed="rId4"/>
-          <a:stretch>
-            <a:fillRect/>
-          </a:stretch>
-        </p:blipFill>
-        <p:spPr>
-          <a:xfrm>
-            <a:off x="3038475" y="3200575"/>
-            <a:ext cx="6115050" cy="2905125"/>
-          </a:xfrm>
-          <a:prstGeom prst="rect">
-            <a:avLst/>
-          </a:prstGeom>
-        </p:spPr>
-      </p:pic>
-    </p:spTree>
-    <p:extLst>
-      <p:ext uri="{BB962C8B-B14F-4D97-AF65-F5344CB8AC3E}">
-        <p14:creationId xmlns:p14="http://schemas.microsoft.com/office/powerpoint/2010/main" val="3835048349"/>
-      </p:ext>
-    </p:extLst>
-  </p:cSld>
-  <p:clrMapOvr>
-    <a:masterClrMapping/>
-  </p:clrMapOvr>
-</p:sld>
-</file>
-
-<file path=ppt/slides/slide7.xml><?xml version="1.0" encoding="utf-8"?>
-<p:sld xmlns:a="http://schemas.openxmlformats.org/drawingml/2006/main" xmlns:r="http://schemas.openxmlformats.org/officeDocument/2006/relationships" xmlns:p="http://schemas.openxmlformats.org/presentationml/2006/main">
-  <p:cSld>
-    <p:spTree>
-      <p:nvGrpSpPr>
-        <p:cNvPr id="1" name=""/>
-        <p:cNvGrpSpPr/>
-        <p:nvPr/>
-      </p:nvGrpSpPr>
-      <p:grpSpPr>
-        <a:xfrm>
-          <a:off x="0" y="0"/>
-          <a:ext cx="0" cy="0"/>
-          <a:chOff x="0" y="0"/>
-          <a:chExt cx="0" cy="0"/>
-        </a:xfrm>
-      </p:grpSpPr>
-      <p:sp>
-        <p:nvSpPr>
-          <p:cNvPr id="2" name="Title 1">
-            <a:extLst>
-              <a:ext uri="{FF2B5EF4-FFF2-40B4-BE49-F238E27FC236}">
-                <a16:creationId xmlns:a16="http://schemas.microsoft.com/office/drawing/2014/main" id="{18796C70-48CA-456B-948B-0D704B7599C7}"/>
-              </a:ext>
-            </a:extLst>
-          </p:cNvPr>
-          <p:cNvSpPr>
-            <a:spLocks noGrp="1"/>
-          </p:cNvSpPr>
-          <p:nvPr>
-            <p:ph type="title"/>
-          </p:nvPr>
-        </p:nvSpPr>
-        <p:spPr/>
-        <p:txBody>
-          <a:bodyPr/>
-          <a:lstStyle/>
-          <a:p>
-            <a:r>
-              <a:rPr lang="en-US" b="1" dirty="0">
-                <a:solidFill>
-                  <a:schemeClr val="accent1"/>
-                </a:solidFill>
-              </a:rPr>
-              <a:t>Nested Functions</a:t>
-            </a:r>
-          </a:p>
-        </p:txBody>
-      </p:sp>
-      <p:sp>
-        <p:nvSpPr>
-          <p:cNvPr id="7" name="Content Placeholder 2">
-            <a:extLst>
-              <a:ext uri="{FF2B5EF4-FFF2-40B4-BE49-F238E27FC236}">
-                <a16:creationId xmlns:a16="http://schemas.microsoft.com/office/drawing/2014/main" id="{DD682402-4A30-C4D0-6B19-BE99A5E8F9D3}"/>
-              </a:ext>
-            </a:extLst>
-          </p:cNvPr>
-          <p:cNvSpPr>
-            <a:spLocks noGrp="1"/>
-          </p:cNvSpPr>
-          <p:nvPr>
-            <p:ph idx="1"/>
-          </p:nvPr>
-        </p:nvSpPr>
-        <p:spPr>
-          <a:xfrm>
-            <a:off x="838200" y="1825626"/>
-            <a:ext cx="10515600" cy="648153"/>
+            <a:off x="838200" y="1825625"/>
+            <a:ext cx="10515600" cy="1325563"/>
           </a:xfrm>
         </p:spPr>
         <p:txBody>
-          <a:bodyPr>
-            <a:normAutofit/>
-          </a:bodyPr>
+          <a:bodyPr/>
           <a:lstStyle/>
           <a:p>
             <a:pPr marL="0" indent="0">
@@ -7656,17 +7808,17 @@
             </a:pPr>
             <a:r>
               <a:rPr lang="en-US" dirty="0"/>
-              <a:t>You can use a function as an argument of another function.</a:t>
-            </a:r>
-          </a:p>
-        </p:txBody>
-      </p:sp>
-      <p:sp>
-        <p:nvSpPr>
-          <p:cNvPr id="8" name="Content Placeholder 2">
-            <a:extLst>
-              <a:ext uri="{FF2B5EF4-FFF2-40B4-BE49-F238E27FC236}">
-                <a16:creationId xmlns:a16="http://schemas.microsoft.com/office/drawing/2014/main" id="{7395CA8D-A196-E19F-518E-DBDAE430018C}"/>
+              <a:t>The IF function allows you to return (display) values based on whether the specified condition has been met </a:t>
+            </a:r>
+          </a:p>
+        </p:txBody>
+      </p:sp>
+      <p:sp>
+        <p:nvSpPr>
+          <p:cNvPr id="15" name="Content Placeholder 2">
+            <a:extLst>
+              <a:ext uri="{FF2B5EF4-FFF2-40B4-BE49-F238E27FC236}">
+                <a16:creationId xmlns:a16="http://schemas.microsoft.com/office/drawing/2014/main" id="{F5261D3D-41BF-DBDF-CED4-5E038F81D2E4}"/>
               </a:ext>
             </a:extLst>
           </p:cNvPr>
@@ -7861,6 +8013,471 @@
               <a:rPr lang="en-US" sz="2000" dirty="0">
                 <a:hlinkClick r:id="rId3"/>
               </a:rPr>
+              <a:t>More examples</a:t>
+            </a:r>
+            <a:endParaRPr lang="en-US" sz="2000" dirty="0"/>
+          </a:p>
+        </p:txBody>
+      </p:sp>
+      <p:pic>
+        <p:nvPicPr>
+          <p:cNvPr id="4" name="Picture 3">
+            <a:extLst>
+              <a:ext uri="{FF2B5EF4-FFF2-40B4-BE49-F238E27FC236}">
+                <a16:creationId xmlns:a16="http://schemas.microsoft.com/office/drawing/2014/main" id="{BCDBD985-BBAC-F751-3F5A-C7FE13EBD396}"/>
+              </a:ext>
+            </a:extLst>
+          </p:cNvPr>
+          <p:cNvPicPr>
+            <a:picLocks noChangeAspect="1"/>
+          </p:cNvPicPr>
+          <p:nvPr/>
+        </p:nvPicPr>
+        <p:blipFill>
+          <a:blip r:embed="rId4"/>
+          <a:stretch>
+            <a:fillRect/>
+          </a:stretch>
+        </p:blipFill>
+        <p:spPr>
+          <a:xfrm>
+            <a:off x="1809750" y="3043335"/>
+            <a:ext cx="8572500" cy="2133600"/>
+          </a:xfrm>
+          <a:prstGeom prst="rect">
+            <a:avLst/>
+          </a:prstGeom>
+        </p:spPr>
+      </p:pic>
+    </p:spTree>
+    <p:extLst>
+      <p:ext uri="{BB962C8B-B14F-4D97-AF65-F5344CB8AC3E}">
+        <p14:creationId xmlns:p14="http://schemas.microsoft.com/office/powerpoint/2010/main" val="2797490795"/>
+      </p:ext>
+    </p:extLst>
+  </p:cSld>
+  <p:clrMapOvr>
+    <a:masterClrMapping/>
+  </p:clrMapOvr>
+</p:sld>
+</file>
+
+<file path=ppt/slides/slide7.xml><?xml version="1.0" encoding="utf-8"?>
+<p:sld xmlns:a="http://schemas.openxmlformats.org/drawingml/2006/main" xmlns:r="http://schemas.openxmlformats.org/officeDocument/2006/relationships" xmlns:p="http://schemas.openxmlformats.org/presentationml/2006/main">
+  <p:cSld>
+    <p:spTree>
+      <p:nvGrpSpPr>
+        <p:cNvPr id="1" name=""/>
+        <p:cNvGrpSpPr/>
+        <p:nvPr/>
+      </p:nvGrpSpPr>
+      <p:grpSpPr>
+        <a:xfrm>
+          <a:off x="0" y="0"/>
+          <a:ext cx="0" cy="0"/>
+          <a:chOff x="0" y="0"/>
+          <a:chExt cx="0" cy="0"/>
+        </a:xfrm>
+      </p:grpSpPr>
+      <p:sp>
+        <p:nvSpPr>
+          <p:cNvPr id="2" name="Title 1">
+            <a:extLst>
+              <a:ext uri="{FF2B5EF4-FFF2-40B4-BE49-F238E27FC236}">
+                <a16:creationId xmlns:a16="http://schemas.microsoft.com/office/drawing/2014/main" id="{18796C70-48CA-456B-948B-0D704B7599C7}"/>
+              </a:ext>
+            </a:extLst>
+          </p:cNvPr>
+          <p:cNvSpPr>
+            <a:spLocks noGrp="1"/>
+          </p:cNvSpPr>
+          <p:nvPr>
+            <p:ph type="title"/>
+          </p:nvPr>
+        </p:nvSpPr>
+        <p:spPr>
+          <a:xfrm>
+            <a:off x="838200" y="365125"/>
+            <a:ext cx="10515600" cy="568325"/>
+          </a:xfrm>
+        </p:spPr>
+        <p:txBody>
+          <a:bodyPr>
+            <a:normAutofit fontScale="90000"/>
+          </a:bodyPr>
+          <a:lstStyle/>
+          <a:p>
+            <a:r>
+              <a:rPr lang="en-US" sz="3600" b="1" dirty="0">
+                <a:solidFill>
+                  <a:schemeClr val="accent1"/>
+                </a:solidFill>
+              </a:rPr>
+              <a:t>IF Statements</a:t>
+            </a:r>
+          </a:p>
+        </p:txBody>
+      </p:sp>
+      <p:pic>
+        <p:nvPicPr>
+          <p:cNvPr id="5" name="Picture 4">
+            <a:extLst>
+              <a:ext uri="{FF2B5EF4-FFF2-40B4-BE49-F238E27FC236}">
+                <a16:creationId xmlns:a16="http://schemas.microsoft.com/office/drawing/2014/main" id="{70DE1C58-C3B9-E539-5F5A-7295AE33E6FB}"/>
+              </a:ext>
+            </a:extLst>
+          </p:cNvPr>
+          <p:cNvPicPr>
+            <a:picLocks noChangeAspect="1"/>
+          </p:cNvPicPr>
+          <p:nvPr/>
+        </p:nvPicPr>
+        <p:blipFill>
+          <a:blip r:embed="rId3"/>
+          <a:stretch>
+            <a:fillRect/>
+          </a:stretch>
+        </p:blipFill>
+        <p:spPr>
+          <a:xfrm>
+            <a:off x="2785909" y="1091291"/>
+            <a:ext cx="6620182" cy="1634201"/>
+          </a:xfrm>
+          <a:prstGeom prst="rect">
+            <a:avLst/>
+          </a:prstGeom>
+        </p:spPr>
+      </p:pic>
+      <p:pic>
+        <p:nvPicPr>
+          <p:cNvPr id="7" name="Picture 6">
+            <a:extLst>
+              <a:ext uri="{FF2B5EF4-FFF2-40B4-BE49-F238E27FC236}">
+                <a16:creationId xmlns:a16="http://schemas.microsoft.com/office/drawing/2014/main" id="{500F9DB6-FC50-5C69-32CE-94EE18673F64}"/>
+              </a:ext>
+            </a:extLst>
+          </p:cNvPr>
+          <p:cNvPicPr>
+            <a:picLocks noChangeAspect="1"/>
+          </p:cNvPicPr>
+          <p:nvPr/>
+        </p:nvPicPr>
+        <p:blipFill>
+          <a:blip r:embed="rId4"/>
+          <a:stretch>
+            <a:fillRect/>
+          </a:stretch>
+        </p:blipFill>
+        <p:spPr>
+          <a:xfrm>
+            <a:off x="3038475" y="3200575"/>
+            <a:ext cx="6115050" cy="2905125"/>
+          </a:xfrm>
+          <a:prstGeom prst="rect">
+            <a:avLst/>
+          </a:prstGeom>
+        </p:spPr>
+      </p:pic>
+    </p:spTree>
+    <p:extLst>
+      <p:ext uri="{BB962C8B-B14F-4D97-AF65-F5344CB8AC3E}">
+        <p14:creationId xmlns:p14="http://schemas.microsoft.com/office/powerpoint/2010/main" val="3835048349"/>
+      </p:ext>
+    </p:extLst>
+  </p:cSld>
+  <p:clrMapOvr>
+    <a:masterClrMapping/>
+  </p:clrMapOvr>
+</p:sld>
+</file>
+
+<file path=ppt/slides/slide8.xml><?xml version="1.0" encoding="utf-8"?>
+<p:sld xmlns:a="http://schemas.openxmlformats.org/drawingml/2006/main" xmlns:r="http://schemas.openxmlformats.org/officeDocument/2006/relationships" xmlns:p="http://schemas.openxmlformats.org/presentationml/2006/main">
+  <p:cSld>
+    <p:spTree>
+      <p:nvGrpSpPr>
+        <p:cNvPr id="1" name=""/>
+        <p:cNvGrpSpPr/>
+        <p:nvPr/>
+      </p:nvGrpSpPr>
+      <p:grpSpPr>
+        <a:xfrm>
+          <a:off x="0" y="0"/>
+          <a:ext cx="0" cy="0"/>
+          <a:chOff x="0" y="0"/>
+          <a:chExt cx="0" cy="0"/>
+        </a:xfrm>
+      </p:grpSpPr>
+      <p:sp>
+        <p:nvSpPr>
+          <p:cNvPr id="2" name="Title 1">
+            <a:extLst>
+              <a:ext uri="{FF2B5EF4-FFF2-40B4-BE49-F238E27FC236}">
+                <a16:creationId xmlns:a16="http://schemas.microsoft.com/office/drawing/2014/main" id="{18796C70-48CA-456B-948B-0D704B7599C7}"/>
+              </a:ext>
+            </a:extLst>
+          </p:cNvPr>
+          <p:cNvSpPr>
+            <a:spLocks noGrp="1"/>
+          </p:cNvSpPr>
+          <p:nvPr>
+            <p:ph type="title"/>
+          </p:nvPr>
+        </p:nvSpPr>
+        <p:spPr/>
+        <p:txBody>
+          <a:bodyPr/>
+          <a:lstStyle/>
+          <a:p>
+            <a:r>
+              <a:rPr lang="en-US" b="1" dirty="0">
+                <a:solidFill>
+                  <a:schemeClr val="accent1"/>
+                </a:solidFill>
+              </a:rPr>
+              <a:t>Nested Functions</a:t>
+            </a:r>
+          </a:p>
+        </p:txBody>
+      </p:sp>
+      <p:sp>
+        <p:nvSpPr>
+          <p:cNvPr id="7" name="Content Placeholder 2">
+            <a:extLst>
+              <a:ext uri="{FF2B5EF4-FFF2-40B4-BE49-F238E27FC236}">
+                <a16:creationId xmlns:a16="http://schemas.microsoft.com/office/drawing/2014/main" id="{DD682402-4A30-C4D0-6B19-BE99A5E8F9D3}"/>
+              </a:ext>
+            </a:extLst>
+          </p:cNvPr>
+          <p:cNvSpPr>
+            <a:spLocks noGrp="1"/>
+          </p:cNvSpPr>
+          <p:nvPr>
+            <p:ph idx="1"/>
+          </p:nvPr>
+        </p:nvSpPr>
+        <p:spPr>
+          <a:xfrm>
+            <a:off x="838200" y="1825626"/>
+            <a:ext cx="10515600" cy="648153"/>
+          </a:xfrm>
+        </p:spPr>
+        <p:txBody>
+          <a:bodyPr>
+            <a:normAutofit/>
+          </a:bodyPr>
+          <a:lstStyle/>
+          <a:p>
+            <a:pPr marL="0" indent="0">
+              <a:buNone/>
+            </a:pPr>
+            <a:r>
+              <a:rPr lang="en-US" dirty="0"/>
+              <a:t>You can use a function as an argument of another function.</a:t>
+            </a:r>
+          </a:p>
+        </p:txBody>
+      </p:sp>
+      <p:sp>
+        <p:nvSpPr>
+          <p:cNvPr id="8" name="Content Placeholder 2">
+            <a:extLst>
+              <a:ext uri="{FF2B5EF4-FFF2-40B4-BE49-F238E27FC236}">
+                <a16:creationId xmlns:a16="http://schemas.microsoft.com/office/drawing/2014/main" id="{7395CA8D-A196-E19F-518E-DBDAE430018C}"/>
+              </a:ext>
+            </a:extLst>
+          </p:cNvPr>
+          <p:cNvSpPr txBox="1">
+            <a:spLocks/>
+          </p:cNvSpPr>
+          <p:nvPr/>
+        </p:nvSpPr>
+        <p:spPr>
+          <a:xfrm>
+            <a:off x="838200" y="6072030"/>
+            <a:ext cx="2207079" cy="420845"/>
+          </a:xfrm>
+          <a:prstGeom prst="rect">
+            <a:avLst/>
+          </a:prstGeom>
+        </p:spPr>
+        <p:txBody>
+          <a:bodyPr vert="horz" lIns="91440" tIns="45720" rIns="91440" bIns="45720" rtlCol="0">
+            <a:normAutofit/>
+          </a:bodyPr>
+          <a:lstStyle>
+            <a:lvl1pPr marL="228600" indent="-228600" algn="l" defTabSz="914400" rtl="0" eaLnBrk="1" latinLnBrk="0" hangingPunct="1">
+              <a:lnSpc>
+                <a:spcPct val="90000"/>
+              </a:lnSpc>
+              <a:spcBef>
+                <a:spcPts val="1000"/>
+              </a:spcBef>
+              <a:buFont typeface="Arial" panose="020B0604020202020204" pitchFamily="34" charset="0"/>
+              <a:buChar char="•"/>
+              <a:defRPr sz="2800" kern="1200">
+                <a:solidFill>
+                  <a:schemeClr val="tx1"/>
+                </a:solidFill>
+                <a:latin typeface="+mn-lt"/>
+                <a:ea typeface="+mn-ea"/>
+                <a:cs typeface="+mn-cs"/>
+              </a:defRPr>
+            </a:lvl1pPr>
+            <a:lvl2pPr marL="685800" indent="-228600" algn="l" defTabSz="914400" rtl="0" eaLnBrk="1" latinLnBrk="0" hangingPunct="1">
+              <a:lnSpc>
+                <a:spcPct val="90000"/>
+              </a:lnSpc>
+              <a:spcBef>
+                <a:spcPts val="500"/>
+              </a:spcBef>
+              <a:buFont typeface="Arial" panose="020B0604020202020204" pitchFamily="34" charset="0"/>
+              <a:buChar char="•"/>
+              <a:defRPr sz="2400" kern="1200">
+                <a:solidFill>
+                  <a:schemeClr val="tx1"/>
+                </a:solidFill>
+                <a:latin typeface="+mn-lt"/>
+                <a:ea typeface="+mn-ea"/>
+                <a:cs typeface="+mn-cs"/>
+              </a:defRPr>
+            </a:lvl2pPr>
+            <a:lvl3pPr marL="1143000" indent="-228600" algn="l" defTabSz="914400" rtl="0" eaLnBrk="1" latinLnBrk="0" hangingPunct="1">
+              <a:lnSpc>
+                <a:spcPct val="90000"/>
+              </a:lnSpc>
+              <a:spcBef>
+                <a:spcPts val="500"/>
+              </a:spcBef>
+              <a:buFont typeface="Arial" panose="020B0604020202020204" pitchFamily="34" charset="0"/>
+              <a:buChar char="•"/>
+              <a:defRPr sz="2000" kern="1200">
+                <a:solidFill>
+                  <a:schemeClr val="tx1"/>
+                </a:solidFill>
+                <a:latin typeface="+mn-lt"/>
+                <a:ea typeface="+mn-ea"/>
+                <a:cs typeface="+mn-cs"/>
+              </a:defRPr>
+            </a:lvl3pPr>
+            <a:lvl4pPr marL="1600200" indent="-228600" algn="l" defTabSz="914400" rtl="0" eaLnBrk="1" latinLnBrk="0" hangingPunct="1">
+              <a:lnSpc>
+                <a:spcPct val="90000"/>
+              </a:lnSpc>
+              <a:spcBef>
+                <a:spcPts val="500"/>
+              </a:spcBef>
+              <a:buFont typeface="Arial" panose="020B0604020202020204" pitchFamily="34" charset="0"/>
+              <a:buChar char="•"/>
+              <a:defRPr sz="1800" kern="1200">
+                <a:solidFill>
+                  <a:schemeClr val="tx1"/>
+                </a:solidFill>
+                <a:latin typeface="+mn-lt"/>
+                <a:ea typeface="+mn-ea"/>
+                <a:cs typeface="+mn-cs"/>
+              </a:defRPr>
+            </a:lvl4pPr>
+            <a:lvl5pPr marL="2057400" indent="-228600" algn="l" defTabSz="914400" rtl="0" eaLnBrk="1" latinLnBrk="0" hangingPunct="1">
+              <a:lnSpc>
+                <a:spcPct val="90000"/>
+              </a:lnSpc>
+              <a:spcBef>
+                <a:spcPts val="500"/>
+              </a:spcBef>
+              <a:buFont typeface="Arial" panose="020B0604020202020204" pitchFamily="34" charset="0"/>
+              <a:buChar char="•"/>
+              <a:defRPr sz="1800" kern="1200">
+                <a:solidFill>
+                  <a:schemeClr val="tx1"/>
+                </a:solidFill>
+                <a:latin typeface="+mn-lt"/>
+                <a:ea typeface="+mn-ea"/>
+                <a:cs typeface="+mn-cs"/>
+              </a:defRPr>
+            </a:lvl5pPr>
+            <a:lvl6pPr marL="2514600" indent="-228600" algn="l" defTabSz="914400" rtl="0" eaLnBrk="1" latinLnBrk="0" hangingPunct="1">
+              <a:lnSpc>
+                <a:spcPct val="90000"/>
+              </a:lnSpc>
+              <a:spcBef>
+                <a:spcPts val="500"/>
+              </a:spcBef>
+              <a:buFont typeface="Arial" panose="020B0604020202020204" pitchFamily="34" charset="0"/>
+              <a:buChar char="•"/>
+              <a:defRPr sz="1800" kern="1200">
+                <a:solidFill>
+                  <a:schemeClr val="tx1"/>
+                </a:solidFill>
+                <a:latin typeface="+mn-lt"/>
+                <a:ea typeface="+mn-ea"/>
+                <a:cs typeface="+mn-cs"/>
+              </a:defRPr>
+            </a:lvl6pPr>
+            <a:lvl7pPr marL="2971800" indent="-228600" algn="l" defTabSz="914400" rtl="0" eaLnBrk="1" latinLnBrk="0" hangingPunct="1">
+              <a:lnSpc>
+                <a:spcPct val="90000"/>
+              </a:lnSpc>
+              <a:spcBef>
+                <a:spcPts val="500"/>
+              </a:spcBef>
+              <a:buFont typeface="Arial" panose="020B0604020202020204" pitchFamily="34" charset="0"/>
+              <a:buChar char="•"/>
+              <a:defRPr sz="1800" kern="1200">
+                <a:solidFill>
+                  <a:schemeClr val="tx1"/>
+                </a:solidFill>
+                <a:latin typeface="+mn-lt"/>
+                <a:ea typeface="+mn-ea"/>
+                <a:cs typeface="+mn-cs"/>
+              </a:defRPr>
+            </a:lvl7pPr>
+            <a:lvl8pPr marL="3429000" indent="-228600" algn="l" defTabSz="914400" rtl="0" eaLnBrk="1" latinLnBrk="0" hangingPunct="1">
+              <a:lnSpc>
+                <a:spcPct val="90000"/>
+              </a:lnSpc>
+              <a:spcBef>
+                <a:spcPts val="500"/>
+              </a:spcBef>
+              <a:buFont typeface="Arial" panose="020B0604020202020204" pitchFamily="34" charset="0"/>
+              <a:buChar char="•"/>
+              <a:defRPr sz="1800" kern="1200">
+                <a:solidFill>
+                  <a:schemeClr val="tx1"/>
+                </a:solidFill>
+                <a:latin typeface="+mn-lt"/>
+                <a:ea typeface="+mn-ea"/>
+                <a:cs typeface="+mn-cs"/>
+              </a:defRPr>
+            </a:lvl8pPr>
+            <a:lvl9pPr marL="3886200" indent="-228600" algn="l" defTabSz="914400" rtl="0" eaLnBrk="1" latinLnBrk="0" hangingPunct="1">
+              <a:lnSpc>
+                <a:spcPct val="90000"/>
+              </a:lnSpc>
+              <a:spcBef>
+                <a:spcPts val="500"/>
+              </a:spcBef>
+              <a:buFont typeface="Arial" panose="020B0604020202020204" pitchFamily="34" charset="0"/>
+              <a:buChar char="•"/>
+              <a:defRPr sz="1800" kern="1200">
+                <a:solidFill>
+                  <a:schemeClr val="tx1"/>
+                </a:solidFill>
+                <a:latin typeface="+mn-lt"/>
+                <a:ea typeface="+mn-ea"/>
+                <a:cs typeface="+mn-cs"/>
+              </a:defRPr>
+            </a:lvl9pPr>
+          </a:lstStyle>
+          <a:p>
+            <a:pPr marL="0" indent="0">
+              <a:buFont typeface="Arial" panose="020B0604020202020204" pitchFamily="34" charset="0"/>
+              <a:buNone/>
+            </a:pPr>
+            <a:r>
+              <a:rPr lang="en-US" sz="2000" dirty="0">
+                <a:hlinkClick r:id="rId3"/>
+              </a:rPr>
               <a:t>Reference</a:t>
             </a:r>
             <a:endParaRPr lang="en-US" sz="2000" dirty="0"/>
@@ -7910,7 +8527,7 @@
 </p:sld>
 </file>
 
-<file path=ppt/slides/slide8.xml><?xml version="1.0" encoding="utf-8"?>
+<file path=ppt/slides/slide9.xml><?xml version="1.0" encoding="utf-8"?>
 <p:sld xmlns:a="http://schemas.openxmlformats.org/drawingml/2006/main" xmlns:r="http://schemas.openxmlformats.org/officeDocument/2006/relationships" xmlns:p="http://schemas.openxmlformats.org/presentationml/2006/main">
   <p:cSld>
     <p:spTree>
@@ -8030,171 +8647,6 @@
     <p:extLst>
       <p:ext uri="{BB962C8B-B14F-4D97-AF65-F5344CB8AC3E}">
         <p14:creationId xmlns:p14="http://schemas.microsoft.com/office/powerpoint/2010/main" val="3484380306"/>
-      </p:ext>
-    </p:extLst>
-  </p:cSld>
-  <p:clrMapOvr>
-    <a:masterClrMapping/>
-  </p:clrMapOvr>
-</p:sld>
-</file>
-
-<file path=ppt/slides/slide9.xml><?xml version="1.0" encoding="utf-8"?>
-<p:sld xmlns:a="http://schemas.openxmlformats.org/drawingml/2006/main" xmlns:r="http://schemas.openxmlformats.org/officeDocument/2006/relationships" xmlns:p="http://schemas.openxmlformats.org/presentationml/2006/main">
-  <p:cSld>
-    <p:spTree>
-      <p:nvGrpSpPr>
-        <p:cNvPr id="1" name=""/>
-        <p:cNvGrpSpPr/>
-        <p:nvPr/>
-      </p:nvGrpSpPr>
-      <p:grpSpPr>
-        <a:xfrm>
-          <a:off x="0" y="0"/>
-          <a:ext cx="0" cy="0"/>
-          <a:chOff x="0" y="0"/>
-          <a:chExt cx="0" cy="0"/>
-        </a:xfrm>
-      </p:grpSpPr>
-      <p:sp>
-        <p:nvSpPr>
-          <p:cNvPr id="12" name="Title 1">
-            <a:extLst>
-              <a:ext uri="{FF2B5EF4-FFF2-40B4-BE49-F238E27FC236}">
-                <a16:creationId xmlns:a16="http://schemas.microsoft.com/office/drawing/2014/main" id="{F45D353A-45D9-BDD2-D808-7C349F6E83E0}"/>
-              </a:ext>
-            </a:extLst>
-          </p:cNvPr>
-          <p:cNvSpPr>
-            <a:spLocks noGrp="1"/>
-          </p:cNvSpPr>
-          <p:nvPr>
-            <p:ph type="title"/>
-          </p:nvPr>
-        </p:nvSpPr>
-        <p:spPr>
-          <a:xfrm>
-            <a:off x="838200" y="365125"/>
-            <a:ext cx="10515600" cy="568325"/>
-          </a:xfrm>
-        </p:spPr>
-        <p:txBody>
-          <a:bodyPr>
-            <a:normAutofit fontScale="90000"/>
-          </a:bodyPr>
-          <a:lstStyle/>
-          <a:p>
-            <a:r>
-              <a:rPr lang="en-US" sz="3600" b="1" dirty="0">
-                <a:solidFill>
-                  <a:schemeClr val="accent1"/>
-                </a:solidFill>
-              </a:rPr>
-              <a:t>Nested Functions</a:t>
-            </a:r>
-          </a:p>
-        </p:txBody>
-      </p:sp>
-      <p:pic>
-        <p:nvPicPr>
-          <p:cNvPr id="3" name="Picture 2">
-            <a:extLst>
-              <a:ext uri="{FF2B5EF4-FFF2-40B4-BE49-F238E27FC236}">
-                <a16:creationId xmlns:a16="http://schemas.microsoft.com/office/drawing/2014/main" id="{9381D0F8-E64A-F8DF-9A99-0069450E1640}"/>
-              </a:ext>
-            </a:extLst>
-          </p:cNvPr>
-          <p:cNvPicPr>
-            <a:picLocks noChangeAspect="1"/>
-          </p:cNvPicPr>
-          <p:nvPr/>
-        </p:nvPicPr>
-        <p:blipFill>
-          <a:blip r:embed="rId3"/>
-          <a:stretch>
-            <a:fillRect/>
-          </a:stretch>
-        </p:blipFill>
-        <p:spPr>
-          <a:xfrm>
-            <a:off x="419100" y="2597151"/>
-            <a:ext cx="5459587" cy="2695151"/>
-          </a:xfrm>
-          <a:prstGeom prst="rect">
-            <a:avLst/>
-          </a:prstGeom>
-        </p:spPr>
-      </p:pic>
-      <p:pic>
-        <p:nvPicPr>
-          <p:cNvPr id="6" name="Picture 5">
-            <a:extLst>
-              <a:ext uri="{FF2B5EF4-FFF2-40B4-BE49-F238E27FC236}">
-                <a16:creationId xmlns:a16="http://schemas.microsoft.com/office/drawing/2014/main" id="{DF108ECA-C365-164B-5BB5-DE2A35316E5D}"/>
-              </a:ext>
-            </a:extLst>
-          </p:cNvPr>
-          <p:cNvPicPr>
-            <a:picLocks noChangeAspect="1"/>
-          </p:cNvPicPr>
-          <p:nvPr/>
-        </p:nvPicPr>
-        <p:blipFill>
-          <a:blip r:embed="rId4"/>
-          <a:stretch>
-            <a:fillRect/>
-          </a:stretch>
-        </p:blipFill>
-        <p:spPr>
-          <a:xfrm>
-            <a:off x="6096000" y="2444751"/>
-            <a:ext cx="5797859" cy="2814637"/>
-          </a:xfrm>
-          <a:prstGeom prst="rect">
-            <a:avLst/>
-          </a:prstGeom>
-        </p:spPr>
-      </p:pic>
-      <p:sp>
-        <p:nvSpPr>
-          <p:cNvPr id="10" name="Content Placeholder 9">
-            <a:extLst>
-              <a:ext uri="{FF2B5EF4-FFF2-40B4-BE49-F238E27FC236}">
-                <a16:creationId xmlns:a16="http://schemas.microsoft.com/office/drawing/2014/main" id="{045DEBD5-CAF6-BA4E-4B8E-32ADAC1F9719}"/>
-              </a:ext>
-            </a:extLst>
-          </p:cNvPr>
-          <p:cNvSpPr>
-            <a:spLocks noGrp="1"/>
-          </p:cNvSpPr>
-          <p:nvPr>
-            <p:ph idx="1"/>
-          </p:nvPr>
-        </p:nvSpPr>
-        <p:spPr>
-          <a:xfrm>
-            <a:off x="838200" y="1404938"/>
-            <a:ext cx="10515600" cy="568325"/>
-          </a:xfrm>
-        </p:spPr>
-        <p:txBody>
-          <a:bodyPr/>
-          <a:lstStyle/>
-          <a:p>
-            <a:pPr marL="0" indent="0">
-              <a:buNone/>
-            </a:pPr>
-            <a:r>
-              <a:rPr lang="en-US" dirty="0"/>
-              <a:t>These are the same:</a:t>
-            </a:r>
-          </a:p>
-        </p:txBody>
-      </p:sp>
-    </p:spTree>
-    <p:extLst>
-      <p:ext uri="{BB962C8B-B14F-4D97-AF65-F5344CB8AC3E}">
-        <p14:creationId xmlns:p14="http://schemas.microsoft.com/office/powerpoint/2010/main" val="3815552995"/>
       </p:ext>
     </p:extLst>
   </p:cSld>
@@ -8795,18 +9247,18 @@
 </file>
 
 <file path=customXml/item1.xml><?xml version="1.0" encoding="utf-8"?>
-<p:properties xmlns:p="http://schemas.microsoft.com/office/2006/metadata/properties" xmlns:xsi="http://www.w3.org/2001/XMLSchema-instance" xmlns:pc="http://schemas.microsoft.com/office/infopath/2007/PartnerControls">
-  <documentManagement/>
-</p:properties>
-</file>
-
-<file path=customXml/item2.xml><?xml version="1.0" encoding="utf-8"?>
 <?mso-contentType ?>
 <FormTemplates xmlns="http://schemas.microsoft.com/sharepoint/v3/contenttype/forms">
   <Display>DocumentLibraryForm</Display>
   <Edit>DocumentLibraryForm</Edit>
   <New>DocumentLibraryForm</New>
 </FormTemplates>
+</file>
+
+<file path=customXml/item2.xml><?xml version="1.0" encoding="utf-8"?>
+<p:properties xmlns:p="http://schemas.microsoft.com/office/2006/metadata/properties" xmlns:xsi="http://www.w3.org/2001/XMLSchema-instance" xmlns:pc="http://schemas.microsoft.com/office/infopath/2007/PartnerControls">
+  <documentManagement/>
+</p:properties>
 </file>
 
 <file path=customXml/item3.xml><?xml version="1.0" encoding="utf-8"?>
@@ -8989,6 +9441,14 @@
 </file>
 
 <file path=customXml/itemProps1.xml><?xml version="1.0" encoding="utf-8"?>
+<ds:datastoreItem xmlns:ds="http://schemas.openxmlformats.org/officeDocument/2006/customXml" ds:itemID="{8ADF127F-DA0B-482F-97E0-90B52A503C8D}">
+  <ds:schemaRefs>
+    <ds:schemaRef ds:uri="http://schemas.microsoft.com/sharepoint/v3/contenttype/forms"/>
+  </ds:schemaRefs>
+</ds:datastoreItem>
+</file>
+
+<file path=customXml/itemProps2.xml><?xml version="1.0" encoding="utf-8"?>
 <ds:datastoreItem xmlns:ds="http://schemas.openxmlformats.org/officeDocument/2006/customXml" ds:itemID="{EBB40029-5245-4DBF-95C2-47B86CF70C9F}">
   <ds:schemaRefs>
     <ds:schemaRef ds:uri="http://schemas.openxmlformats.org/package/2006/metadata/core-properties"/>
@@ -9001,14 +9461,6 @@
     <ds:schemaRef ds:uri="http://purl.org/dc/terms/"/>
     <ds:schemaRef ds:uri="8424d317-e79a-4f10-a77e-d0bbf29883f4"/>
     <ds:schemaRef ds:uri="5a3927fa-f9bf-4e21-9816-7f925d835449"/>
-  </ds:schemaRefs>
-</ds:datastoreItem>
-</file>
-
-<file path=customXml/itemProps2.xml><?xml version="1.0" encoding="utf-8"?>
-<ds:datastoreItem xmlns:ds="http://schemas.openxmlformats.org/officeDocument/2006/customXml" ds:itemID="{8ADF127F-DA0B-482F-97E0-90B52A503C8D}">
-  <ds:schemaRefs>
-    <ds:schemaRef ds:uri="http://schemas.microsoft.com/sharepoint/v3/contenttype/forms"/>
   </ds:schemaRefs>
 </ds:datastoreItem>
 </file>

</xml_diff>